<commit_message>
Added Slide CVCS vs DVCS
</commit_message>
<xml_diff>
--- a/Git&Github.pptx
+++ b/Git&Github.pptx
@@ -1,6 +1,6 @@
 
 <file path=ppt/presentation.xml><?xml version="1.0" encoding="utf-8"?>
-<p:presentation xmlns:a="http://schemas.openxmlformats.org/drawingml/2006/main" xmlns:r="http://schemas.openxmlformats.org/officeDocument/2006/relationships" xmlns:p="http://schemas.openxmlformats.org/presentationml/2006/main" saveSubsetFonts="1">
+<p:presentation xmlns:a="http://schemas.openxmlformats.org/drawingml/2006/main" xmlns:r="http://schemas.openxmlformats.org/officeDocument/2006/relationships" xmlns:p="http://schemas.openxmlformats.org/presentationml/2006/main" embedTrueTypeFonts="1">
   <p:sldMasterIdLst>
     <p:sldMasterId id="2147483648" r:id="rId1"/>
   </p:sldMasterIdLst>
@@ -10,9 +10,28 @@
     <p:sldId id="259" r:id="rId4"/>
     <p:sldId id="260" r:id="rId5"/>
     <p:sldId id="261" r:id="rId6"/>
+    <p:sldId id="262" r:id="rId7"/>
   </p:sldIdLst>
   <p:sldSz cx="12192000" cy="6858000"/>
   <p:notesSz cx="6858000" cy="9144000"/>
+  <p:embeddedFontLst>
+    <p:embeddedFont>
+      <p:font typeface="Calibri" panose="020F0502020204030204" pitchFamily="34" charset="0"/>
+      <p:regular r:id="rId8"/>
+      <p:bold r:id="rId9"/>
+      <p:italic r:id="rId10"/>
+      <p:boldItalic r:id="rId11"/>
+    </p:embeddedFont>
+    <p:embeddedFont>
+      <p:font typeface="Diavlo Book" panose="02000000000000000000" pitchFamily="50" charset="0"/>
+      <p:regular r:id="rId12"/>
+    </p:embeddedFont>
+    <p:embeddedFont>
+      <p:font typeface="Calibri Light" panose="020F0302020204030204" pitchFamily="34" charset="0"/>
+      <p:regular r:id="rId13"/>
+      <p:italic r:id="rId14"/>
+    </p:embeddedFont>
+  </p:embeddedFontLst>
   <p:defaultTextStyle>
     <a:defPPr>
       <a:defRPr lang="en-US"/>
@@ -118,6 +137,7 @@
             <p14:sldId id="259"/>
             <p14:sldId id="260"/>
             <p14:sldId id="261"/>
+            <p14:sldId id="262"/>
           </p14:sldIdLst>
         </p14:section>
       </p14:sectionLst>
@@ -9117,6 +9137,2027 @@
 </p:sld>
 </file>
 
+<file path=ppt/slides/slide6.xml><?xml version="1.0" encoding="utf-8"?>
+<p:sld xmlns:a="http://schemas.openxmlformats.org/drawingml/2006/main" xmlns:r="http://schemas.openxmlformats.org/officeDocument/2006/relationships" xmlns:p="http://schemas.openxmlformats.org/presentationml/2006/main">
+  <p:cSld>
+    <p:spTree>
+      <p:nvGrpSpPr>
+        <p:cNvPr id="1" name=""/>
+        <p:cNvGrpSpPr/>
+        <p:nvPr/>
+      </p:nvGrpSpPr>
+      <p:grpSpPr>
+        <a:xfrm>
+          <a:off x="0" y="0"/>
+          <a:ext cx="0" cy="0"/>
+          <a:chOff x="0" y="0"/>
+          <a:chExt cx="0" cy="0"/>
+        </a:xfrm>
+      </p:grpSpPr>
+      <p:pic>
+        <p:nvPicPr>
+          <p:cNvPr id="4" name="Picture 3"/>
+          <p:cNvPicPr>
+            <a:picLocks noChangeAspect="1"/>
+          </p:cNvPicPr>
+          <p:nvPr/>
+        </p:nvPicPr>
+        <p:blipFill>
+          <a:blip r:embed="rId2" cstate="print">
+            <a:extLst>
+              <a:ext uri="{28A0092B-C50C-407E-A947-70E740481C1C}">
+                <a14:useLocalDpi xmlns:a14="http://schemas.microsoft.com/office/drawing/2010/main" val="0"/>
+              </a:ext>
+            </a:extLst>
+          </a:blip>
+          <a:stretch>
+            <a:fillRect/>
+          </a:stretch>
+        </p:blipFill>
+        <p:spPr>
+          <a:xfrm>
+            <a:off x="500229" y="669215"/>
+            <a:ext cx="2773686" cy="1158242"/>
+          </a:xfrm>
+          <a:prstGeom prst="rect">
+            <a:avLst/>
+          </a:prstGeom>
+        </p:spPr>
+      </p:pic>
+      <p:cxnSp>
+        <p:nvCxnSpPr>
+          <p:cNvPr id="6" name="Straight Connector 5"/>
+          <p:cNvCxnSpPr/>
+          <p:nvPr/>
+        </p:nvCxnSpPr>
+        <p:spPr>
+          <a:xfrm>
+            <a:off x="3469342" y="295835"/>
+            <a:ext cx="13446" cy="2030506"/>
+          </a:xfrm>
+          <a:prstGeom prst="line">
+            <a:avLst/>
+          </a:prstGeom>
+        </p:spPr>
+        <p:style>
+          <a:lnRef idx="1">
+            <a:schemeClr val="accent1"/>
+          </a:lnRef>
+          <a:fillRef idx="0">
+            <a:schemeClr val="accent1"/>
+          </a:fillRef>
+          <a:effectRef idx="0">
+            <a:schemeClr val="accent1"/>
+          </a:effectRef>
+          <a:fontRef idx="minor">
+            <a:schemeClr val="tx1"/>
+          </a:fontRef>
+        </p:style>
+      </p:cxnSp>
+      <p:cxnSp>
+        <p:nvCxnSpPr>
+          <p:cNvPr id="7" name="Straight Connector 6"/>
+          <p:cNvCxnSpPr/>
+          <p:nvPr/>
+        </p:nvCxnSpPr>
+        <p:spPr>
+          <a:xfrm>
+            <a:off x="3581401" y="300318"/>
+            <a:ext cx="8964" cy="2026023"/>
+          </a:xfrm>
+          <a:prstGeom prst="line">
+            <a:avLst/>
+          </a:prstGeom>
+        </p:spPr>
+        <p:style>
+          <a:lnRef idx="1">
+            <a:schemeClr val="accent1"/>
+          </a:lnRef>
+          <a:fillRef idx="0">
+            <a:schemeClr val="accent1"/>
+          </a:fillRef>
+          <a:effectRef idx="0">
+            <a:schemeClr val="accent1"/>
+          </a:effectRef>
+          <a:fontRef idx="minor">
+            <a:schemeClr val="tx1"/>
+          </a:fontRef>
+        </p:style>
+      </p:cxnSp>
+      <p:cxnSp>
+        <p:nvCxnSpPr>
+          <p:cNvPr id="8" name="Straight Connector 7"/>
+          <p:cNvCxnSpPr/>
+          <p:nvPr/>
+        </p:nvCxnSpPr>
+        <p:spPr>
+          <a:xfrm flipH="1">
+            <a:off x="1116108" y="1939068"/>
+            <a:ext cx="10892116" cy="77994"/>
+          </a:xfrm>
+          <a:prstGeom prst="line">
+            <a:avLst/>
+          </a:prstGeom>
+        </p:spPr>
+        <p:style>
+          <a:lnRef idx="1">
+            <a:schemeClr val="accent1"/>
+          </a:lnRef>
+          <a:fillRef idx="0">
+            <a:schemeClr val="accent1"/>
+          </a:fillRef>
+          <a:effectRef idx="0">
+            <a:schemeClr val="accent1"/>
+          </a:effectRef>
+          <a:fontRef idx="minor">
+            <a:schemeClr val="tx1"/>
+          </a:fontRef>
+        </p:style>
+      </p:cxnSp>
+      <p:cxnSp>
+        <p:nvCxnSpPr>
+          <p:cNvPr id="12" name="Straight Connector 11"/>
+          <p:cNvCxnSpPr/>
+          <p:nvPr/>
+        </p:nvCxnSpPr>
+        <p:spPr>
+          <a:xfrm flipH="1">
+            <a:off x="1120591" y="2073091"/>
+            <a:ext cx="10887633" cy="56030"/>
+          </a:xfrm>
+          <a:prstGeom prst="line">
+            <a:avLst/>
+          </a:prstGeom>
+        </p:spPr>
+        <p:style>
+          <a:lnRef idx="1">
+            <a:schemeClr val="accent1"/>
+          </a:lnRef>
+          <a:fillRef idx="0">
+            <a:schemeClr val="accent1"/>
+          </a:fillRef>
+          <a:effectRef idx="0">
+            <a:schemeClr val="accent1"/>
+          </a:effectRef>
+          <a:fontRef idx="minor">
+            <a:schemeClr val="tx1"/>
+          </a:fontRef>
+        </p:style>
+      </p:cxnSp>
+      <p:sp>
+        <p:nvSpPr>
+          <p:cNvPr id="15" name="Rectangle 14"/>
+          <p:cNvSpPr/>
+          <p:nvPr/>
+        </p:nvSpPr>
+        <p:spPr>
+          <a:xfrm>
+            <a:off x="5467526" y="678199"/>
+            <a:ext cx="4347985" cy="923330"/>
+          </a:xfrm>
+          <a:prstGeom prst="rect">
+            <a:avLst/>
+          </a:prstGeom>
+          <a:noFill/>
+        </p:spPr>
+        <p:txBody>
+          <a:bodyPr wrap="none" lIns="91440" tIns="45720" rIns="91440" bIns="45720">
+            <a:spAutoFit/>
+          </a:bodyPr>
+          <a:lstStyle/>
+          <a:p>
+            <a:pPr algn="ctr"/>
+            <a:r>
+              <a:rPr lang="en-US" sz="5400" b="0" cap="none" spc="0" dirty="0" smtClean="0">
+                <a:ln w="0"/>
+                <a:solidFill>
+                  <a:schemeClr val="accent1"/>
+                </a:solidFill>
+                <a:effectLst>
+                  <a:outerShdw blurRad="38100" dist="25400" dir="5400000" algn="ctr" rotWithShape="0">
+                    <a:srgbClr val="6E747A">
+                      <a:alpha val="43000"/>
+                    </a:srgbClr>
+                  </a:outerShdw>
+                </a:effectLst>
+              </a:rPr>
+              <a:t>What is a VCS?</a:t>
+            </a:r>
+            <a:endParaRPr lang="en-US" sz="5400" b="0" cap="none" spc="0" dirty="0">
+              <a:ln w="0"/>
+              <a:solidFill>
+                <a:schemeClr val="accent1"/>
+              </a:solidFill>
+              <a:effectLst>
+                <a:outerShdw blurRad="38100" dist="25400" dir="5400000" algn="ctr" rotWithShape="0">
+                  <a:srgbClr val="6E747A">
+                    <a:alpha val="43000"/>
+                  </a:srgbClr>
+                </a:outerShdw>
+              </a:effectLst>
+            </a:endParaRPr>
+          </a:p>
+        </p:txBody>
+      </p:sp>
+      <p:sp>
+        <p:nvSpPr>
+          <p:cNvPr id="2" name="TextBox 1"/>
+          <p:cNvSpPr txBox="1"/>
+          <p:nvPr/>
+        </p:nvSpPr>
+        <p:spPr>
+          <a:xfrm>
+            <a:off x="3482784" y="2330376"/>
+            <a:ext cx="2912585" cy="461665"/>
+          </a:xfrm>
+          <a:prstGeom prst="rect">
+            <a:avLst/>
+          </a:prstGeom>
+          <a:noFill/>
+          <a:ln>
+            <a:solidFill>
+              <a:srgbClr val="F05033"/>
+            </a:solidFill>
+          </a:ln>
+        </p:spPr>
+        <p:txBody>
+          <a:bodyPr wrap="square" rtlCol="0">
+            <a:spAutoFit/>
+          </a:bodyPr>
+          <a:lstStyle/>
+          <a:p>
+            <a:pPr algn="ctr"/>
+            <a:r>
+              <a:rPr lang="en-US" sz="2400" dirty="0" smtClean="0">
+                <a:latin typeface="Diavlo Book" panose="02000000000000000000" pitchFamily="50" charset="0"/>
+              </a:rPr>
+              <a:t>TWO types of VCS :</a:t>
+            </a:r>
+            <a:endParaRPr lang="en-US" sz="2400" dirty="0">
+              <a:latin typeface="Diavlo Book" panose="02000000000000000000" pitchFamily="50" charset="0"/>
+            </a:endParaRPr>
+          </a:p>
+        </p:txBody>
+      </p:sp>
+      <p:sp>
+        <p:nvSpPr>
+          <p:cNvPr id="16" name="TextBox 15"/>
+          <p:cNvSpPr txBox="1"/>
+          <p:nvPr/>
+        </p:nvSpPr>
+        <p:spPr>
+          <a:xfrm>
+            <a:off x="2043951" y="3235374"/>
+            <a:ext cx="2912585" cy="461665"/>
+          </a:xfrm>
+          <a:prstGeom prst="rect">
+            <a:avLst/>
+          </a:prstGeom>
+          <a:noFill/>
+          <a:ln>
+            <a:solidFill>
+              <a:srgbClr val="F05033"/>
+            </a:solidFill>
+          </a:ln>
+        </p:spPr>
+        <p:txBody>
+          <a:bodyPr wrap="square" rtlCol="0">
+            <a:spAutoFit/>
+          </a:bodyPr>
+          <a:lstStyle/>
+          <a:p>
+            <a:pPr algn="ctr"/>
+            <a:r>
+              <a:rPr lang="en-US" sz="2400" b="1" dirty="0" smtClean="0">
+                <a:latin typeface="Diavlo Book" panose="02000000000000000000" pitchFamily="50" charset="0"/>
+              </a:rPr>
+              <a:t>Centralized VCS</a:t>
+            </a:r>
+            <a:endParaRPr lang="en-US" sz="2400" b="1" dirty="0">
+              <a:latin typeface="Diavlo Book" panose="02000000000000000000" pitchFamily="50" charset="0"/>
+            </a:endParaRPr>
+          </a:p>
+        </p:txBody>
+      </p:sp>
+      <p:sp>
+        <p:nvSpPr>
+          <p:cNvPr id="17" name="TextBox 16"/>
+          <p:cNvSpPr txBox="1"/>
+          <p:nvPr/>
+        </p:nvSpPr>
+        <p:spPr>
+          <a:xfrm>
+            <a:off x="5943171" y="3230413"/>
+            <a:ext cx="2912585" cy="461665"/>
+          </a:xfrm>
+          <a:prstGeom prst="rect">
+            <a:avLst/>
+          </a:prstGeom>
+          <a:noFill/>
+          <a:ln>
+            <a:solidFill>
+              <a:srgbClr val="F05033"/>
+            </a:solidFill>
+          </a:ln>
+        </p:spPr>
+        <p:txBody>
+          <a:bodyPr wrap="square" rtlCol="0">
+            <a:spAutoFit/>
+          </a:bodyPr>
+          <a:lstStyle/>
+          <a:p>
+            <a:pPr algn="ctr"/>
+            <a:r>
+              <a:rPr lang="en-US" sz="2400" b="1" dirty="0" smtClean="0">
+                <a:latin typeface="Diavlo Book" panose="02000000000000000000" pitchFamily="50" charset="0"/>
+              </a:rPr>
+              <a:t>Decentralized VCS</a:t>
+            </a:r>
+            <a:endParaRPr lang="en-US" sz="2400" b="1" dirty="0">
+              <a:latin typeface="Diavlo Book" panose="02000000000000000000" pitchFamily="50" charset="0"/>
+            </a:endParaRPr>
+          </a:p>
+        </p:txBody>
+      </p:sp>
+      <p:sp>
+        <p:nvSpPr>
+          <p:cNvPr id="3" name="Left Brace 2"/>
+          <p:cNvSpPr/>
+          <p:nvPr/>
+        </p:nvSpPr>
+        <p:spPr>
+          <a:xfrm rot="5400000">
+            <a:off x="5137020" y="2204606"/>
+            <a:ext cx="398032" cy="1653585"/>
+          </a:xfrm>
+          <a:prstGeom prst="leftBrace">
+            <a:avLst/>
+          </a:prstGeom>
+        </p:spPr>
+        <p:style>
+          <a:lnRef idx="1">
+            <a:schemeClr val="accent1"/>
+          </a:lnRef>
+          <a:fillRef idx="0">
+            <a:schemeClr val="accent1"/>
+          </a:fillRef>
+          <a:effectRef idx="0">
+            <a:schemeClr val="accent1"/>
+          </a:effectRef>
+          <a:fontRef idx="minor">
+            <a:schemeClr val="tx1"/>
+          </a:fontRef>
+        </p:style>
+        <p:txBody>
+          <a:bodyPr rtlCol="0" anchor="ctr"/>
+          <a:lstStyle/>
+          <a:p>
+            <a:pPr algn="ctr"/>
+            <a:endParaRPr lang="en-US"/>
+          </a:p>
+        </p:txBody>
+      </p:sp>
+      <p:sp>
+        <p:nvSpPr>
+          <p:cNvPr id="18" name="TextBox 17"/>
+          <p:cNvSpPr txBox="1"/>
+          <p:nvPr/>
+        </p:nvSpPr>
+        <p:spPr>
+          <a:xfrm>
+            <a:off x="2043951" y="4030973"/>
+            <a:ext cx="2912585" cy="400110"/>
+          </a:xfrm>
+          <a:prstGeom prst="rect">
+            <a:avLst/>
+          </a:prstGeom>
+          <a:noFill/>
+          <a:ln>
+            <a:solidFill>
+              <a:srgbClr val="F05033"/>
+            </a:solidFill>
+          </a:ln>
+        </p:spPr>
+        <p:txBody>
+          <a:bodyPr wrap="square" rtlCol="0">
+            <a:spAutoFit/>
+          </a:bodyPr>
+          <a:lstStyle/>
+          <a:p>
+            <a:pPr algn="ctr"/>
+            <a:r>
+              <a:rPr lang="en-US" sz="2000" dirty="0" smtClean="0">
+                <a:latin typeface="Diavlo Book" panose="02000000000000000000" pitchFamily="50" charset="0"/>
+              </a:rPr>
+              <a:t>One True Source</a:t>
+            </a:r>
+            <a:endParaRPr lang="en-US" sz="2000" dirty="0">
+              <a:latin typeface="Diavlo Book" panose="02000000000000000000" pitchFamily="50" charset="0"/>
+            </a:endParaRPr>
+          </a:p>
+        </p:txBody>
+      </p:sp>
+      <p:cxnSp>
+        <p:nvCxnSpPr>
+          <p:cNvPr id="20" name="Straight Connector 19"/>
+          <p:cNvCxnSpPr/>
+          <p:nvPr/>
+        </p:nvCxnSpPr>
+        <p:spPr>
+          <a:xfrm>
+            <a:off x="3273915" y="3692078"/>
+            <a:ext cx="0" cy="338895"/>
+          </a:xfrm>
+          <a:prstGeom prst="line">
+            <a:avLst/>
+          </a:prstGeom>
+        </p:spPr>
+        <p:style>
+          <a:lnRef idx="1">
+            <a:schemeClr val="accent1"/>
+          </a:lnRef>
+          <a:fillRef idx="0">
+            <a:schemeClr val="accent1"/>
+          </a:fillRef>
+          <a:effectRef idx="0">
+            <a:schemeClr val="accent1"/>
+          </a:effectRef>
+          <a:fontRef idx="minor">
+            <a:schemeClr val="tx1"/>
+          </a:fontRef>
+        </p:style>
+      </p:cxnSp>
+      <p:sp>
+        <p:nvSpPr>
+          <p:cNvPr id="21" name="TextBox 20"/>
+          <p:cNvSpPr txBox="1"/>
+          <p:nvPr/>
+        </p:nvSpPr>
+        <p:spPr>
+          <a:xfrm>
+            <a:off x="5943171" y="4024659"/>
+            <a:ext cx="2912585" cy="400110"/>
+          </a:xfrm>
+          <a:prstGeom prst="rect">
+            <a:avLst/>
+          </a:prstGeom>
+          <a:noFill/>
+          <a:ln>
+            <a:solidFill>
+              <a:srgbClr val="F05033"/>
+            </a:solidFill>
+          </a:ln>
+        </p:spPr>
+        <p:txBody>
+          <a:bodyPr wrap="square" rtlCol="0">
+            <a:spAutoFit/>
+          </a:bodyPr>
+          <a:lstStyle/>
+          <a:p>
+            <a:pPr algn="ctr"/>
+            <a:r>
+              <a:rPr lang="en-US" sz="2000" dirty="0" smtClean="0">
+                <a:latin typeface="Diavlo Book" panose="02000000000000000000" pitchFamily="50" charset="0"/>
+              </a:rPr>
+              <a:t>Every Clone is a Source</a:t>
+            </a:r>
+            <a:endParaRPr lang="en-US" sz="2000" dirty="0">
+              <a:latin typeface="Diavlo Book" panose="02000000000000000000" pitchFamily="50" charset="0"/>
+            </a:endParaRPr>
+          </a:p>
+        </p:txBody>
+      </p:sp>
+      <p:sp>
+        <p:nvSpPr>
+          <p:cNvPr id="22" name="TextBox 21"/>
+          <p:cNvSpPr txBox="1"/>
+          <p:nvPr/>
+        </p:nvSpPr>
+        <p:spPr>
+          <a:xfrm>
+            <a:off x="2043951" y="4765017"/>
+            <a:ext cx="2912585" cy="707886"/>
+          </a:xfrm>
+          <a:prstGeom prst="rect">
+            <a:avLst/>
+          </a:prstGeom>
+          <a:noFill/>
+          <a:ln>
+            <a:solidFill>
+              <a:srgbClr val="F05033"/>
+            </a:solidFill>
+          </a:ln>
+        </p:spPr>
+        <p:txBody>
+          <a:bodyPr wrap="square" rtlCol="0">
+            <a:spAutoFit/>
+          </a:bodyPr>
+          <a:lstStyle/>
+          <a:p>
+            <a:pPr algn="ctr"/>
+            <a:r>
+              <a:rPr lang="en-US" sz="2000" dirty="0" smtClean="0">
+                <a:latin typeface="Diavlo Book" panose="02000000000000000000" pitchFamily="50" charset="0"/>
+              </a:rPr>
+              <a:t>Very Complex Branching… </a:t>
+            </a:r>
+            <a:r>
+              <a:rPr lang="en-US" sz="2000" dirty="0" smtClean="0">
+                <a:latin typeface="Diavlo Book" panose="02000000000000000000" pitchFamily="50" charset="0"/>
+                <a:sym typeface="Wingdings" panose="05000000000000000000" pitchFamily="2" charset="2"/>
+              </a:rPr>
+              <a:t></a:t>
+            </a:r>
+            <a:endParaRPr lang="en-US" sz="2000" dirty="0">
+              <a:latin typeface="Diavlo Book" panose="02000000000000000000" pitchFamily="50" charset="0"/>
+            </a:endParaRPr>
+          </a:p>
+        </p:txBody>
+      </p:sp>
+      <p:cxnSp>
+        <p:nvCxnSpPr>
+          <p:cNvPr id="23" name="Straight Connector 22"/>
+          <p:cNvCxnSpPr/>
+          <p:nvPr/>
+        </p:nvCxnSpPr>
+        <p:spPr>
+          <a:xfrm>
+            <a:off x="3264951" y="4422699"/>
+            <a:ext cx="0" cy="338895"/>
+          </a:xfrm>
+          <a:prstGeom prst="line">
+            <a:avLst/>
+          </a:prstGeom>
+        </p:spPr>
+        <p:style>
+          <a:lnRef idx="1">
+            <a:schemeClr val="accent1"/>
+          </a:lnRef>
+          <a:fillRef idx="0">
+            <a:schemeClr val="accent1"/>
+          </a:fillRef>
+          <a:effectRef idx="0">
+            <a:schemeClr val="accent1"/>
+          </a:effectRef>
+          <a:fontRef idx="minor">
+            <a:schemeClr val="tx1"/>
+          </a:fontRef>
+        </p:style>
+      </p:cxnSp>
+      <p:cxnSp>
+        <p:nvCxnSpPr>
+          <p:cNvPr id="24" name="Straight Connector 23"/>
+          <p:cNvCxnSpPr/>
+          <p:nvPr/>
+        </p:nvCxnSpPr>
+        <p:spPr>
+          <a:xfrm>
+            <a:off x="7783163" y="3685330"/>
+            <a:ext cx="0" cy="338895"/>
+          </a:xfrm>
+          <a:prstGeom prst="line">
+            <a:avLst/>
+          </a:prstGeom>
+        </p:spPr>
+        <p:style>
+          <a:lnRef idx="1">
+            <a:schemeClr val="accent1"/>
+          </a:lnRef>
+          <a:fillRef idx="0">
+            <a:schemeClr val="accent1"/>
+          </a:fillRef>
+          <a:effectRef idx="0">
+            <a:schemeClr val="accent1"/>
+          </a:effectRef>
+          <a:fontRef idx="minor">
+            <a:schemeClr val="tx1"/>
+          </a:fontRef>
+        </p:style>
+      </p:cxnSp>
+      <p:cxnSp>
+        <p:nvCxnSpPr>
+          <p:cNvPr id="25" name="Straight Connector 24"/>
+          <p:cNvCxnSpPr/>
+          <p:nvPr/>
+        </p:nvCxnSpPr>
+        <p:spPr>
+          <a:xfrm>
+            <a:off x="7796610" y="4422698"/>
+            <a:ext cx="0" cy="338895"/>
+          </a:xfrm>
+          <a:prstGeom prst="line">
+            <a:avLst/>
+          </a:prstGeom>
+        </p:spPr>
+        <p:style>
+          <a:lnRef idx="1">
+            <a:schemeClr val="accent1"/>
+          </a:lnRef>
+          <a:fillRef idx="0">
+            <a:schemeClr val="accent1"/>
+          </a:fillRef>
+          <a:effectRef idx="0">
+            <a:schemeClr val="accent1"/>
+          </a:effectRef>
+          <a:fontRef idx="minor">
+            <a:schemeClr val="tx1"/>
+          </a:fontRef>
+        </p:style>
+      </p:cxnSp>
+      <p:sp>
+        <p:nvSpPr>
+          <p:cNvPr id="26" name="TextBox 25"/>
+          <p:cNvSpPr txBox="1"/>
+          <p:nvPr/>
+        </p:nvSpPr>
+        <p:spPr>
+          <a:xfrm>
+            <a:off x="5943171" y="4766220"/>
+            <a:ext cx="2912585" cy="707886"/>
+          </a:xfrm>
+          <a:prstGeom prst="rect">
+            <a:avLst/>
+          </a:prstGeom>
+          <a:noFill/>
+          <a:ln>
+            <a:solidFill>
+              <a:srgbClr val="F05033"/>
+            </a:solidFill>
+          </a:ln>
+        </p:spPr>
+        <p:txBody>
+          <a:bodyPr wrap="square" rtlCol="0">
+            <a:spAutoFit/>
+          </a:bodyPr>
+          <a:lstStyle/>
+          <a:p>
+            <a:pPr algn="ctr"/>
+            <a:r>
+              <a:rPr lang="en-US" sz="2000" dirty="0" smtClean="0">
+                <a:latin typeface="Diavlo Book" panose="02000000000000000000" pitchFamily="50" charset="0"/>
+              </a:rPr>
+              <a:t>Very Easy Branching and Merging</a:t>
+            </a:r>
+            <a:endParaRPr lang="en-US" sz="2000" dirty="0">
+              <a:latin typeface="Diavlo Book" panose="02000000000000000000" pitchFamily="50" charset="0"/>
+            </a:endParaRPr>
+          </a:p>
+        </p:txBody>
+      </p:sp>
+    </p:spTree>
+    <p:extLst>
+      <p:ext uri="{BB962C8B-B14F-4D97-AF65-F5344CB8AC3E}">
+        <p14:creationId xmlns:p14="http://schemas.microsoft.com/office/powerpoint/2010/main" val="3682560763"/>
+      </p:ext>
+    </p:extLst>
+  </p:cSld>
+  <p:clrMapOvr>
+    <a:masterClrMapping/>
+  </p:clrMapOvr>
+  <mc:AlternateContent xmlns:mc="http://schemas.openxmlformats.org/markup-compatibility/2006" xmlns:p15="http://schemas.microsoft.com/office/powerpoint/2012/main">
+    <mc:Choice Requires="p15">
+      <p:transition xmlns:p14="http://schemas.microsoft.com/office/powerpoint/2010/main" spd="slow" p14:dur="2000">
+        <p15:prstTrans prst="drape"/>
+      </p:transition>
+    </mc:Choice>
+    <mc:Fallback xmlns="">
+      <p:transition spd="slow">
+        <p:fade/>
+      </p:transition>
+    </mc:Fallback>
+  </mc:AlternateContent>
+  <p:timing>
+    <p:tnLst>
+      <p:par>
+        <p:cTn id="1" dur="indefinite" restart="never" nodeType="tmRoot">
+          <p:childTnLst>
+            <p:seq concurrent="1" nextAc="seek">
+              <p:cTn id="2" dur="indefinite" nodeType="mainSeq">
+                <p:childTnLst>
+                  <p:par>
+                    <p:cTn id="3" fill="hold">
+                      <p:stCondLst>
+                        <p:cond delay="indefinite"/>
+                      </p:stCondLst>
+                      <p:childTnLst>
+                        <p:par>
+                          <p:cTn id="4" fill="hold">
+                            <p:stCondLst>
+                              <p:cond delay="0"/>
+                            </p:stCondLst>
+                            <p:childTnLst>
+                              <p:par>
+                                <p:cTn id="5" presetID="2" presetClass="entr" presetSubtype="2" fill="hold" grpId="0" nodeType="clickEffect">
+                                  <p:stCondLst>
+                                    <p:cond delay="0"/>
+                                  </p:stCondLst>
+                                  <p:iterate type="wd">
+                                    <p:tmPct val="15000"/>
+                                  </p:iterate>
+                                  <p:childTnLst>
+                                    <p:set>
+                                      <p:cBhvr>
+                                        <p:cTn id="6" dur="1" fill="hold">
+                                          <p:stCondLst>
+                                            <p:cond delay="0"/>
+                                          </p:stCondLst>
+                                        </p:cTn>
+                                        <p:tgtEl>
+                                          <p:spTgt spid="2"/>
+                                        </p:tgtEl>
+                                        <p:attrNameLst>
+                                          <p:attrName>style.visibility</p:attrName>
+                                        </p:attrNameLst>
+                                      </p:cBhvr>
+                                      <p:to>
+                                        <p:strVal val="visible"/>
+                                      </p:to>
+                                    </p:set>
+                                    <p:anim calcmode="lin" valueType="num">
+                                      <p:cBhvr additive="base">
+                                        <p:cTn id="7" dur="500" fill="hold"/>
+                                        <p:tgtEl>
+                                          <p:spTgt spid="2"/>
+                                        </p:tgtEl>
+                                        <p:attrNameLst>
+                                          <p:attrName>ppt_x</p:attrName>
+                                        </p:attrNameLst>
+                                      </p:cBhvr>
+                                      <p:tavLst>
+                                        <p:tav tm="0">
+                                          <p:val>
+                                            <p:strVal val="1+#ppt_w/2"/>
+                                          </p:val>
+                                        </p:tav>
+                                        <p:tav tm="100000">
+                                          <p:val>
+                                            <p:strVal val="#ppt_x"/>
+                                          </p:val>
+                                        </p:tav>
+                                      </p:tavLst>
+                                    </p:anim>
+                                    <p:anim calcmode="lin" valueType="num">
+                                      <p:cBhvr additive="base">
+                                        <p:cTn id="8" dur="500" fill="hold"/>
+                                        <p:tgtEl>
+                                          <p:spTgt spid="2"/>
+                                        </p:tgtEl>
+                                        <p:attrNameLst>
+                                          <p:attrName>ppt_y</p:attrName>
+                                        </p:attrNameLst>
+                                      </p:cBhvr>
+                                      <p:tavLst>
+                                        <p:tav tm="0">
+                                          <p:val>
+                                            <p:strVal val="#ppt_y"/>
+                                          </p:val>
+                                        </p:tav>
+                                        <p:tav tm="100000">
+                                          <p:val>
+                                            <p:strVal val="#ppt_y"/>
+                                          </p:val>
+                                        </p:tav>
+                                      </p:tavLst>
+                                    </p:anim>
+                                  </p:childTnLst>
+                                </p:cTn>
+                              </p:par>
+                            </p:childTnLst>
+                          </p:cTn>
+                        </p:par>
+                      </p:childTnLst>
+                    </p:cTn>
+                  </p:par>
+                  <p:par>
+                    <p:cTn id="9" fill="hold">
+                      <p:stCondLst>
+                        <p:cond delay="indefinite"/>
+                      </p:stCondLst>
+                      <p:childTnLst>
+                        <p:par>
+                          <p:cTn id="10" fill="hold">
+                            <p:stCondLst>
+                              <p:cond delay="0"/>
+                            </p:stCondLst>
+                            <p:childTnLst>
+                              <p:par>
+                                <p:cTn id="11" presetID="2" presetClass="entr" presetSubtype="2" fill="hold" grpId="0" nodeType="clickEffect">
+                                  <p:stCondLst>
+                                    <p:cond delay="0"/>
+                                  </p:stCondLst>
+                                  <p:iterate type="wd">
+                                    <p:tmPct val="15000"/>
+                                  </p:iterate>
+                                  <p:childTnLst>
+                                    <p:set>
+                                      <p:cBhvr>
+                                        <p:cTn id="12" dur="1" fill="hold">
+                                          <p:stCondLst>
+                                            <p:cond delay="0"/>
+                                          </p:stCondLst>
+                                        </p:cTn>
+                                        <p:tgtEl>
+                                          <p:spTgt spid="16"/>
+                                        </p:tgtEl>
+                                        <p:attrNameLst>
+                                          <p:attrName>style.visibility</p:attrName>
+                                        </p:attrNameLst>
+                                      </p:cBhvr>
+                                      <p:to>
+                                        <p:strVal val="visible"/>
+                                      </p:to>
+                                    </p:set>
+                                    <p:anim calcmode="lin" valueType="num">
+                                      <p:cBhvr additive="base">
+                                        <p:cTn id="13" dur="500" fill="hold"/>
+                                        <p:tgtEl>
+                                          <p:spTgt spid="16"/>
+                                        </p:tgtEl>
+                                        <p:attrNameLst>
+                                          <p:attrName>ppt_x</p:attrName>
+                                        </p:attrNameLst>
+                                      </p:cBhvr>
+                                      <p:tavLst>
+                                        <p:tav tm="0">
+                                          <p:val>
+                                            <p:strVal val="1+#ppt_w/2"/>
+                                          </p:val>
+                                        </p:tav>
+                                        <p:tav tm="100000">
+                                          <p:val>
+                                            <p:strVal val="#ppt_x"/>
+                                          </p:val>
+                                        </p:tav>
+                                      </p:tavLst>
+                                    </p:anim>
+                                    <p:anim calcmode="lin" valueType="num">
+                                      <p:cBhvr additive="base">
+                                        <p:cTn id="14" dur="500" fill="hold"/>
+                                        <p:tgtEl>
+                                          <p:spTgt spid="16"/>
+                                        </p:tgtEl>
+                                        <p:attrNameLst>
+                                          <p:attrName>ppt_y</p:attrName>
+                                        </p:attrNameLst>
+                                      </p:cBhvr>
+                                      <p:tavLst>
+                                        <p:tav tm="0">
+                                          <p:val>
+                                            <p:strVal val="#ppt_y"/>
+                                          </p:val>
+                                        </p:tav>
+                                        <p:tav tm="100000">
+                                          <p:val>
+                                            <p:strVal val="#ppt_y"/>
+                                          </p:val>
+                                        </p:tav>
+                                      </p:tavLst>
+                                    </p:anim>
+                                  </p:childTnLst>
+                                </p:cTn>
+                              </p:par>
+                            </p:childTnLst>
+                          </p:cTn>
+                        </p:par>
+                        <p:par>
+                          <p:cTn id="15" fill="hold">
+                            <p:stCondLst>
+                              <p:cond delay="575"/>
+                            </p:stCondLst>
+                            <p:childTnLst>
+                              <p:par>
+                                <p:cTn id="16" presetID="12" presetClass="entr" presetSubtype="4" fill="hold" grpId="1" nodeType="afterEffect">
+                                  <p:stCondLst>
+                                    <p:cond delay="0"/>
+                                  </p:stCondLst>
+                                  <p:childTnLst>
+                                    <p:set>
+                                      <p:cBhvr>
+                                        <p:cTn id="17" dur="1" fill="hold">
+                                          <p:stCondLst>
+                                            <p:cond delay="0"/>
+                                          </p:stCondLst>
+                                        </p:cTn>
+                                        <p:tgtEl>
+                                          <p:spTgt spid="3"/>
+                                        </p:tgtEl>
+                                        <p:attrNameLst>
+                                          <p:attrName>style.visibility</p:attrName>
+                                        </p:attrNameLst>
+                                      </p:cBhvr>
+                                      <p:to>
+                                        <p:strVal val="visible"/>
+                                      </p:to>
+                                    </p:set>
+                                    <p:anim calcmode="lin" valueType="num">
+                                      <p:cBhvr additive="base">
+                                        <p:cTn id="18" dur="500"/>
+                                        <p:tgtEl>
+                                          <p:spTgt spid="3"/>
+                                        </p:tgtEl>
+                                        <p:attrNameLst>
+                                          <p:attrName>ppt_y</p:attrName>
+                                        </p:attrNameLst>
+                                      </p:cBhvr>
+                                      <p:tavLst>
+                                        <p:tav tm="0">
+                                          <p:val>
+                                            <p:strVal val="#ppt_y+#ppt_h*1.125000"/>
+                                          </p:val>
+                                        </p:tav>
+                                        <p:tav tm="100000">
+                                          <p:val>
+                                            <p:strVal val="#ppt_y"/>
+                                          </p:val>
+                                        </p:tav>
+                                      </p:tavLst>
+                                    </p:anim>
+                                    <p:animEffect transition="in" filter="wipe(up)">
+                                      <p:cBhvr>
+                                        <p:cTn id="19" dur="500"/>
+                                        <p:tgtEl>
+                                          <p:spTgt spid="3"/>
+                                        </p:tgtEl>
+                                      </p:cBhvr>
+                                    </p:animEffect>
+                                  </p:childTnLst>
+                                </p:cTn>
+                              </p:par>
+                            </p:childTnLst>
+                          </p:cTn>
+                        </p:par>
+                      </p:childTnLst>
+                    </p:cTn>
+                  </p:par>
+                  <p:par>
+                    <p:cTn id="20" fill="hold">
+                      <p:stCondLst>
+                        <p:cond delay="indefinite"/>
+                      </p:stCondLst>
+                      <p:childTnLst>
+                        <p:par>
+                          <p:cTn id="21" fill="hold">
+                            <p:stCondLst>
+                              <p:cond delay="0"/>
+                            </p:stCondLst>
+                            <p:childTnLst>
+                              <p:par>
+                                <p:cTn id="22" presetID="2" presetClass="entr" presetSubtype="2" fill="hold" grpId="0" nodeType="clickEffect">
+                                  <p:stCondLst>
+                                    <p:cond delay="0"/>
+                                  </p:stCondLst>
+                                  <p:iterate type="wd">
+                                    <p:tmPct val="15000"/>
+                                  </p:iterate>
+                                  <p:childTnLst>
+                                    <p:set>
+                                      <p:cBhvr>
+                                        <p:cTn id="23" dur="1" fill="hold">
+                                          <p:stCondLst>
+                                            <p:cond delay="0"/>
+                                          </p:stCondLst>
+                                        </p:cTn>
+                                        <p:tgtEl>
+                                          <p:spTgt spid="17"/>
+                                        </p:tgtEl>
+                                        <p:attrNameLst>
+                                          <p:attrName>style.visibility</p:attrName>
+                                        </p:attrNameLst>
+                                      </p:cBhvr>
+                                      <p:to>
+                                        <p:strVal val="visible"/>
+                                      </p:to>
+                                    </p:set>
+                                    <p:anim calcmode="lin" valueType="num">
+                                      <p:cBhvr additive="base">
+                                        <p:cTn id="24" dur="500" fill="hold"/>
+                                        <p:tgtEl>
+                                          <p:spTgt spid="17"/>
+                                        </p:tgtEl>
+                                        <p:attrNameLst>
+                                          <p:attrName>ppt_x</p:attrName>
+                                        </p:attrNameLst>
+                                      </p:cBhvr>
+                                      <p:tavLst>
+                                        <p:tav tm="0">
+                                          <p:val>
+                                            <p:strVal val="1+#ppt_w/2"/>
+                                          </p:val>
+                                        </p:tav>
+                                        <p:tav tm="100000">
+                                          <p:val>
+                                            <p:strVal val="#ppt_x"/>
+                                          </p:val>
+                                        </p:tav>
+                                      </p:tavLst>
+                                    </p:anim>
+                                    <p:anim calcmode="lin" valueType="num">
+                                      <p:cBhvr additive="base">
+                                        <p:cTn id="25" dur="500" fill="hold"/>
+                                        <p:tgtEl>
+                                          <p:spTgt spid="17"/>
+                                        </p:tgtEl>
+                                        <p:attrNameLst>
+                                          <p:attrName>ppt_y</p:attrName>
+                                        </p:attrNameLst>
+                                      </p:cBhvr>
+                                      <p:tavLst>
+                                        <p:tav tm="0">
+                                          <p:val>
+                                            <p:strVal val="#ppt_y"/>
+                                          </p:val>
+                                        </p:tav>
+                                        <p:tav tm="100000">
+                                          <p:val>
+                                            <p:strVal val="#ppt_y"/>
+                                          </p:val>
+                                        </p:tav>
+                                      </p:tavLst>
+                                    </p:anim>
+                                  </p:childTnLst>
+                                </p:cTn>
+                              </p:par>
+                            </p:childTnLst>
+                          </p:cTn>
+                        </p:par>
+                      </p:childTnLst>
+                    </p:cTn>
+                  </p:par>
+                  <p:par>
+                    <p:cTn id="26" fill="hold">
+                      <p:stCondLst>
+                        <p:cond delay="indefinite"/>
+                      </p:stCondLst>
+                      <p:childTnLst>
+                        <p:par>
+                          <p:cTn id="27" fill="hold">
+                            <p:stCondLst>
+                              <p:cond delay="0"/>
+                            </p:stCondLst>
+                            <p:childTnLst>
+                              <p:par>
+                                <p:cTn id="28" presetID="22" presetClass="entr" presetSubtype="1" fill="hold" nodeType="clickEffect">
+                                  <p:stCondLst>
+                                    <p:cond delay="0"/>
+                                  </p:stCondLst>
+                                  <p:childTnLst>
+                                    <p:set>
+                                      <p:cBhvr>
+                                        <p:cTn id="29" dur="1" fill="hold">
+                                          <p:stCondLst>
+                                            <p:cond delay="0"/>
+                                          </p:stCondLst>
+                                        </p:cTn>
+                                        <p:tgtEl>
+                                          <p:spTgt spid="20"/>
+                                        </p:tgtEl>
+                                        <p:attrNameLst>
+                                          <p:attrName>style.visibility</p:attrName>
+                                        </p:attrNameLst>
+                                      </p:cBhvr>
+                                      <p:to>
+                                        <p:strVal val="visible"/>
+                                      </p:to>
+                                    </p:set>
+                                    <p:animEffect transition="in" filter="wipe(up)">
+                                      <p:cBhvr>
+                                        <p:cTn id="30" dur="500"/>
+                                        <p:tgtEl>
+                                          <p:spTgt spid="20"/>
+                                        </p:tgtEl>
+                                      </p:cBhvr>
+                                    </p:animEffect>
+                                  </p:childTnLst>
+                                </p:cTn>
+                              </p:par>
+                              <p:par>
+                                <p:cTn id="31" presetID="2" presetClass="entr" presetSubtype="2" fill="hold" grpId="0" nodeType="withEffect">
+                                  <p:stCondLst>
+                                    <p:cond delay="0"/>
+                                  </p:stCondLst>
+                                  <p:iterate type="wd">
+                                    <p:tmPct val="15000"/>
+                                  </p:iterate>
+                                  <p:childTnLst>
+                                    <p:set>
+                                      <p:cBhvr>
+                                        <p:cTn id="32" dur="1" fill="hold">
+                                          <p:stCondLst>
+                                            <p:cond delay="0"/>
+                                          </p:stCondLst>
+                                        </p:cTn>
+                                        <p:tgtEl>
+                                          <p:spTgt spid="18"/>
+                                        </p:tgtEl>
+                                        <p:attrNameLst>
+                                          <p:attrName>style.visibility</p:attrName>
+                                        </p:attrNameLst>
+                                      </p:cBhvr>
+                                      <p:to>
+                                        <p:strVal val="visible"/>
+                                      </p:to>
+                                    </p:set>
+                                    <p:anim calcmode="lin" valueType="num">
+                                      <p:cBhvr additive="base">
+                                        <p:cTn id="33" dur="500" fill="hold"/>
+                                        <p:tgtEl>
+                                          <p:spTgt spid="18"/>
+                                        </p:tgtEl>
+                                        <p:attrNameLst>
+                                          <p:attrName>ppt_x</p:attrName>
+                                        </p:attrNameLst>
+                                      </p:cBhvr>
+                                      <p:tavLst>
+                                        <p:tav tm="0">
+                                          <p:val>
+                                            <p:strVal val="1+#ppt_w/2"/>
+                                          </p:val>
+                                        </p:tav>
+                                        <p:tav tm="100000">
+                                          <p:val>
+                                            <p:strVal val="#ppt_x"/>
+                                          </p:val>
+                                        </p:tav>
+                                      </p:tavLst>
+                                    </p:anim>
+                                    <p:anim calcmode="lin" valueType="num">
+                                      <p:cBhvr additive="base">
+                                        <p:cTn id="34" dur="500" fill="hold"/>
+                                        <p:tgtEl>
+                                          <p:spTgt spid="18"/>
+                                        </p:tgtEl>
+                                        <p:attrNameLst>
+                                          <p:attrName>ppt_y</p:attrName>
+                                        </p:attrNameLst>
+                                      </p:cBhvr>
+                                      <p:tavLst>
+                                        <p:tav tm="0">
+                                          <p:val>
+                                            <p:strVal val="#ppt_y"/>
+                                          </p:val>
+                                        </p:tav>
+                                        <p:tav tm="100000">
+                                          <p:val>
+                                            <p:strVal val="#ppt_y"/>
+                                          </p:val>
+                                        </p:tav>
+                                      </p:tavLst>
+                                    </p:anim>
+                                  </p:childTnLst>
+                                </p:cTn>
+                              </p:par>
+                            </p:childTnLst>
+                          </p:cTn>
+                        </p:par>
+                      </p:childTnLst>
+                    </p:cTn>
+                  </p:par>
+                  <p:par>
+                    <p:cTn id="35" fill="hold">
+                      <p:stCondLst>
+                        <p:cond delay="indefinite"/>
+                      </p:stCondLst>
+                      <p:childTnLst>
+                        <p:par>
+                          <p:cTn id="36" fill="hold">
+                            <p:stCondLst>
+                              <p:cond delay="0"/>
+                            </p:stCondLst>
+                            <p:childTnLst>
+                              <p:par>
+                                <p:cTn id="37" presetID="21" presetClass="emph" presetSubtype="0" fill="hold" grpId="1" nodeType="clickEffect">
+                                  <p:stCondLst>
+                                    <p:cond delay="0"/>
+                                  </p:stCondLst>
+                                  <p:iterate type="wd">
+                                    <p:tmPct val="0"/>
+                                  </p:iterate>
+                                  <p:childTnLst>
+                                    <p:animClr clrSpc="hsl" dir="cw">
+                                      <p:cBhvr override="childStyle">
+                                        <p:cTn id="38" dur="500" fill="hold"/>
+                                        <p:tgtEl>
+                                          <p:spTgt spid="18"/>
+                                        </p:tgtEl>
+                                        <p:attrNameLst>
+                                          <p:attrName>style.color</p:attrName>
+                                        </p:attrNameLst>
+                                      </p:cBhvr>
+                                      <p:by>
+                                        <p:hsl h="7200000" s="0" l="0"/>
+                                      </p:by>
+                                    </p:animClr>
+                                    <p:animClr clrSpc="hsl" dir="cw">
+                                      <p:cBhvr>
+                                        <p:cTn id="39" dur="500" fill="hold"/>
+                                        <p:tgtEl>
+                                          <p:spTgt spid="18"/>
+                                        </p:tgtEl>
+                                        <p:attrNameLst>
+                                          <p:attrName>fillcolor</p:attrName>
+                                        </p:attrNameLst>
+                                      </p:cBhvr>
+                                      <p:by>
+                                        <p:hsl h="7200000" s="0" l="0"/>
+                                      </p:by>
+                                    </p:animClr>
+                                    <p:animClr clrSpc="hsl" dir="cw">
+                                      <p:cBhvr>
+                                        <p:cTn id="40" dur="500" fill="hold"/>
+                                        <p:tgtEl>
+                                          <p:spTgt spid="18"/>
+                                        </p:tgtEl>
+                                        <p:attrNameLst>
+                                          <p:attrName>stroke.color</p:attrName>
+                                        </p:attrNameLst>
+                                      </p:cBhvr>
+                                      <p:by>
+                                        <p:hsl h="7200000" s="0" l="0"/>
+                                      </p:by>
+                                    </p:animClr>
+                                    <p:set>
+                                      <p:cBhvr>
+                                        <p:cTn id="41" dur="500" fill="hold"/>
+                                        <p:tgtEl>
+                                          <p:spTgt spid="18"/>
+                                        </p:tgtEl>
+                                        <p:attrNameLst>
+                                          <p:attrName>fill.type</p:attrName>
+                                        </p:attrNameLst>
+                                      </p:cBhvr>
+                                      <p:to>
+                                        <p:strVal val="solid"/>
+                                      </p:to>
+                                    </p:set>
+                                  </p:childTnLst>
+                                </p:cTn>
+                              </p:par>
+                            </p:childTnLst>
+                          </p:cTn>
+                        </p:par>
+                      </p:childTnLst>
+                    </p:cTn>
+                  </p:par>
+                  <p:par>
+                    <p:cTn id="42" fill="hold">
+                      <p:stCondLst>
+                        <p:cond delay="indefinite"/>
+                      </p:stCondLst>
+                      <p:childTnLst>
+                        <p:par>
+                          <p:cTn id="43" fill="hold">
+                            <p:stCondLst>
+                              <p:cond delay="0"/>
+                            </p:stCondLst>
+                            <p:childTnLst>
+                              <p:par>
+                                <p:cTn id="44" presetID="22" presetClass="entr" presetSubtype="1" fill="hold" nodeType="clickEffect">
+                                  <p:stCondLst>
+                                    <p:cond delay="0"/>
+                                  </p:stCondLst>
+                                  <p:childTnLst>
+                                    <p:set>
+                                      <p:cBhvr>
+                                        <p:cTn id="45" dur="1" fill="hold">
+                                          <p:stCondLst>
+                                            <p:cond delay="0"/>
+                                          </p:stCondLst>
+                                        </p:cTn>
+                                        <p:tgtEl>
+                                          <p:spTgt spid="24"/>
+                                        </p:tgtEl>
+                                        <p:attrNameLst>
+                                          <p:attrName>style.visibility</p:attrName>
+                                        </p:attrNameLst>
+                                      </p:cBhvr>
+                                      <p:to>
+                                        <p:strVal val="visible"/>
+                                      </p:to>
+                                    </p:set>
+                                    <p:animEffect transition="in" filter="wipe(up)">
+                                      <p:cBhvr>
+                                        <p:cTn id="46" dur="500"/>
+                                        <p:tgtEl>
+                                          <p:spTgt spid="24"/>
+                                        </p:tgtEl>
+                                      </p:cBhvr>
+                                    </p:animEffect>
+                                  </p:childTnLst>
+                                </p:cTn>
+                              </p:par>
+                              <p:par>
+                                <p:cTn id="47" presetID="2" presetClass="entr" presetSubtype="2" fill="hold" grpId="0" nodeType="withEffect">
+                                  <p:stCondLst>
+                                    <p:cond delay="0"/>
+                                  </p:stCondLst>
+                                  <p:iterate type="wd">
+                                    <p:tmPct val="15000"/>
+                                  </p:iterate>
+                                  <p:childTnLst>
+                                    <p:set>
+                                      <p:cBhvr>
+                                        <p:cTn id="48" dur="1" fill="hold">
+                                          <p:stCondLst>
+                                            <p:cond delay="0"/>
+                                          </p:stCondLst>
+                                        </p:cTn>
+                                        <p:tgtEl>
+                                          <p:spTgt spid="21"/>
+                                        </p:tgtEl>
+                                        <p:attrNameLst>
+                                          <p:attrName>style.visibility</p:attrName>
+                                        </p:attrNameLst>
+                                      </p:cBhvr>
+                                      <p:to>
+                                        <p:strVal val="visible"/>
+                                      </p:to>
+                                    </p:set>
+                                    <p:anim calcmode="lin" valueType="num">
+                                      <p:cBhvr additive="base">
+                                        <p:cTn id="49" dur="500" fill="hold"/>
+                                        <p:tgtEl>
+                                          <p:spTgt spid="21"/>
+                                        </p:tgtEl>
+                                        <p:attrNameLst>
+                                          <p:attrName>ppt_x</p:attrName>
+                                        </p:attrNameLst>
+                                      </p:cBhvr>
+                                      <p:tavLst>
+                                        <p:tav tm="0">
+                                          <p:val>
+                                            <p:strVal val="1+#ppt_w/2"/>
+                                          </p:val>
+                                        </p:tav>
+                                        <p:tav tm="100000">
+                                          <p:val>
+                                            <p:strVal val="#ppt_x"/>
+                                          </p:val>
+                                        </p:tav>
+                                      </p:tavLst>
+                                    </p:anim>
+                                    <p:anim calcmode="lin" valueType="num">
+                                      <p:cBhvr additive="base">
+                                        <p:cTn id="50" dur="500" fill="hold"/>
+                                        <p:tgtEl>
+                                          <p:spTgt spid="21"/>
+                                        </p:tgtEl>
+                                        <p:attrNameLst>
+                                          <p:attrName>ppt_y</p:attrName>
+                                        </p:attrNameLst>
+                                      </p:cBhvr>
+                                      <p:tavLst>
+                                        <p:tav tm="0">
+                                          <p:val>
+                                            <p:strVal val="#ppt_y"/>
+                                          </p:val>
+                                        </p:tav>
+                                        <p:tav tm="100000">
+                                          <p:val>
+                                            <p:strVal val="#ppt_y"/>
+                                          </p:val>
+                                        </p:tav>
+                                      </p:tavLst>
+                                    </p:anim>
+                                  </p:childTnLst>
+                                </p:cTn>
+                              </p:par>
+                            </p:childTnLst>
+                          </p:cTn>
+                        </p:par>
+                      </p:childTnLst>
+                    </p:cTn>
+                  </p:par>
+                  <p:par>
+                    <p:cTn id="51" fill="hold">
+                      <p:stCondLst>
+                        <p:cond delay="indefinite"/>
+                      </p:stCondLst>
+                      <p:childTnLst>
+                        <p:par>
+                          <p:cTn id="52" fill="hold">
+                            <p:stCondLst>
+                              <p:cond delay="0"/>
+                            </p:stCondLst>
+                            <p:childTnLst>
+                              <p:par>
+                                <p:cTn id="53" presetID="21" presetClass="emph" presetSubtype="0" fill="hold" grpId="1" nodeType="clickEffect">
+                                  <p:stCondLst>
+                                    <p:cond delay="0"/>
+                                  </p:stCondLst>
+                                  <p:iterate type="wd">
+                                    <p:tmPct val="0"/>
+                                  </p:iterate>
+                                  <p:childTnLst>
+                                    <p:animClr clrSpc="hsl" dir="cw">
+                                      <p:cBhvr override="childStyle">
+                                        <p:cTn id="54" dur="500" fill="hold"/>
+                                        <p:tgtEl>
+                                          <p:spTgt spid="21"/>
+                                        </p:tgtEl>
+                                        <p:attrNameLst>
+                                          <p:attrName>style.color</p:attrName>
+                                        </p:attrNameLst>
+                                      </p:cBhvr>
+                                      <p:by>
+                                        <p:hsl h="7200000" s="0" l="0"/>
+                                      </p:by>
+                                    </p:animClr>
+                                    <p:animClr clrSpc="hsl" dir="cw">
+                                      <p:cBhvr>
+                                        <p:cTn id="55" dur="500" fill="hold"/>
+                                        <p:tgtEl>
+                                          <p:spTgt spid="21"/>
+                                        </p:tgtEl>
+                                        <p:attrNameLst>
+                                          <p:attrName>fillcolor</p:attrName>
+                                        </p:attrNameLst>
+                                      </p:cBhvr>
+                                      <p:by>
+                                        <p:hsl h="7200000" s="0" l="0"/>
+                                      </p:by>
+                                    </p:animClr>
+                                    <p:animClr clrSpc="hsl" dir="cw">
+                                      <p:cBhvr>
+                                        <p:cTn id="56" dur="500" fill="hold"/>
+                                        <p:tgtEl>
+                                          <p:spTgt spid="21"/>
+                                        </p:tgtEl>
+                                        <p:attrNameLst>
+                                          <p:attrName>stroke.color</p:attrName>
+                                        </p:attrNameLst>
+                                      </p:cBhvr>
+                                      <p:by>
+                                        <p:hsl h="7200000" s="0" l="0"/>
+                                      </p:by>
+                                    </p:animClr>
+                                    <p:set>
+                                      <p:cBhvr>
+                                        <p:cTn id="57" dur="500" fill="hold"/>
+                                        <p:tgtEl>
+                                          <p:spTgt spid="21"/>
+                                        </p:tgtEl>
+                                        <p:attrNameLst>
+                                          <p:attrName>fill.type</p:attrName>
+                                        </p:attrNameLst>
+                                      </p:cBhvr>
+                                      <p:to>
+                                        <p:strVal val="solid"/>
+                                      </p:to>
+                                    </p:set>
+                                  </p:childTnLst>
+                                </p:cTn>
+                              </p:par>
+                            </p:childTnLst>
+                          </p:cTn>
+                        </p:par>
+                      </p:childTnLst>
+                    </p:cTn>
+                  </p:par>
+                  <p:par>
+                    <p:cTn id="58" fill="hold">
+                      <p:stCondLst>
+                        <p:cond delay="indefinite"/>
+                      </p:stCondLst>
+                      <p:childTnLst>
+                        <p:par>
+                          <p:cTn id="59" fill="hold">
+                            <p:stCondLst>
+                              <p:cond delay="0"/>
+                            </p:stCondLst>
+                            <p:childTnLst>
+                              <p:par>
+                                <p:cTn id="60" presetID="2" presetClass="entr" presetSubtype="1" fill="hold" nodeType="clickEffect">
+                                  <p:stCondLst>
+                                    <p:cond delay="0"/>
+                                  </p:stCondLst>
+                                  <p:childTnLst>
+                                    <p:set>
+                                      <p:cBhvr>
+                                        <p:cTn id="61" dur="1" fill="hold">
+                                          <p:stCondLst>
+                                            <p:cond delay="0"/>
+                                          </p:stCondLst>
+                                        </p:cTn>
+                                        <p:tgtEl>
+                                          <p:spTgt spid="23"/>
+                                        </p:tgtEl>
+                                        <p:attrNameLst>
+                                          <p:attrName>style.visibility</p:attrName>
+                                        </p:attrNameLst>
+                                      </p:cBhvr>
+                                      <p:to>
+                                        <p:strVal val="visible"/>
+                                      </p:to>
+                                    </p:set>
+                                    <p:anim calcmode="lin" valueType="num">
+                                      <p:cBhvr additive="base">
+                                        <p:cTn id="62" dur="500" fill="hold"/>
+                                        <p:tgtEl>
+                                          <p:spTgt spid="23"/>
+                                        </p:tgtEl>
+                                        <p:attrNameLst>
+                                          <p:attrName>ppt_x</p:attrName>
+                                        </p:attrNameLst>
+                                      </p:cBhvr>
+                                      <p:tavLst>
+                                        <p:tav tm="0">
+                                          <p:val>
+                                            <p:strVal val="#ppt_x"/>
+                                          </p:val>
+                                        </p:tav>
+                                        <p:tav tm="100000">
+                                          <p:val>
+                                            <p:strVal val="#ppt_x"/>
+                                          </p:val>
+                                        </p:tav>
+                                      </p:tavLst>
+                                    </p:anim>
+                                    <p:anim calcmode="lin" valueType="num">
+                                      <p:cBhvr additive="base">
+                                        <p:cTn id="63" dur="500" fill="hold"/>
+                                        <p:tgtEl>
+                                          <p:spTgt spid="23"/>
+                                        </p:tgtEl>
+                                        <p:attrNameLst>
+                                          <p:attrName>ppt_y</p:attrName>
+                                        </p:attrNameLst>
+                                      </p:cBhvr>
+                                      <p:tavLst>
+                                        <p:tav tm="0">
+                                          <p:val>
+                                            <p:strVal val="0-#ppt_h/2"/>
+                                          </p:val>
+                                        </p:tav>
+                                        <p:tav tm="100000">
+                                          <p:val>
+                                            <p:strVal val="#ppt_y"/>
+                                          </p:val>
+                                        </p:tav>
+                                      </p:tavLst>
+                                    </p:anim>
+                                  </p:childTnLst>
+                                </p:cTn>
+                              </p:par>
+                              <p:par>
+                                <p:cTn id="64" presetID="2" presetClass="entr" presetSubtype="2" fill="hold" grpId="0" nodeType="withEffect">
+                                  <p:stCondLst>
+                                    <p:cond delay="0"/>
+                                  </p:stCondLst>
+                                  <p:iterate type="wd">
+                                    <p:tmPct val="15000"/>
+                                  </p:iterate>
+                                  <p:childTnLst>
+                                    <p:set>
+                                      <p:cBhvr>
+                                        <p:cTn id="65" dur="1" fill="hold">
+                                          <p:stCondLst>
+                                            <p:cond delay="0"/>
+                                          </p:stCondLst>
+                                        </p:cTn>
+                                        <p:tgtEl>
+                                          <p:spTgt spid="22"/>
+                                        </p:tgtEl>
+                                        <p:attrNameLst>
+                                          <p:attrName>style.visibility</p:attrName>
+                                        </p:attrNameLst>
+                                      </p:cBhvr>
+                                      <p:to>
+                                        <p:strVal val="visible"/>
+                                      </p:to>
+                                    </p:set>
+                                    <p:anim calcmode="lin" valueType="num">
+                                      <p:cBhvr additive="base">
+                                        <p:cTn id="66" dur="500" fill="hold"/>
+                                        <p:tgtEl>
+                                          <p:spTgt spid="22"/>
+                                        </p:tgtEl>
+                                        <p:attrNameLst>
+                                          <p:attrName>ppt_x</p:attrName>
+                                        </p:attrNameLst>
+                                      </p:cBhvr>
+                                      <p:tavLst>
+                                        <p:tav tm="0">
+                                          <p:val>
+                                            <p:strVal val="1+#ppt_w/2"/>
+                                          </p:val>
+                                        </p:tav>
+                                        <p:tav tm="100000">
+                                          <p:val>
+                                            <p:strVal val="#ppt_x"/>
+                                          </p:val>
+                                        </p:tav>
+                                      </p:tavLst>
+                                    </p:anim>
+                                    <p:anim calcmode="lin" valueType="num">
+                                      <p:cBhvr additive="base">
+                                        <p:cTn id="67" dur="500" fill="hold"/>
+                                        <p:tgtEl>
+                                          <p:spTgt spid="22"/>
+                                        </p:tgtEl>
+                                        <p:attrNameLst>
+                                          <p:attrName>ppt_y</p:attrName>
+                                        </p:attrNameLst>
+                                      </p:cBhvr>
+                                      <p:tavLst>
+                                        <p:tav tm="0">
+                                          <p:val>
+                                            <p:strVal val="#ppt_y"/>
+                                          </p:val>
+                                        </p:tav>
+                                        <p:tav tm="100000">
+                                          <p:val>
+                                            <p:strVal val="#ppt_y"/>
+                                          </p:val>
+                                        </p:tav>
+                                      </p:tavLst>
+                                    </p:anim>
+                                  </p:childTnLst>
+                                </p:cTn>
+                              </p:par>
+                            </p:childTnLst>
+                          </p:cTn>
+                        </p:par>
+                      </p:childTnLst>
+                    </p:cTn>
+                  </p:par>
+                  <p:par>
+                    <p:cTn id="68" fill="hold">
+                      <p:stCondLst>
+                        <p:cond delay="indefinite"/>
+                      </p:stCondLst>
+                      <p:childTnLst>
+                        <p:par>
+                          <p:cTn id="69" fill="hold">
+                            <p:stCondLst>
+                              <p:cond delay="0"/>
+                            </p:stCondLst>
+                            <p:childTnLst>
+                              <p:par>
+                                <p:cTn id="70" presetID="21" presetClass="emph" presetSubtype="0" fill="hold" grpId="1" nodeType="clickEffect">
+                                  <p:stCondLst>
+                                    <p:cond delay="0"/>
+                                  </p:stCondLst>
+                                  <p:iterate type="wd">
+                                    <p:tmPct val="0"/>
+                                  </p:iterate>
+                                  <p:childTnLst>
+                                    <p:animClr clrSpc="hsl" dir="cw">
+                                      <p:cBhvr override="childStyle">
+                                        <p:cTn id="71" dur="500" fill="hold"/>
+                                        <p:tgtEl>
+                                          <p:spTgt spid="22"/>
+                                        </p:tgtEl>
+                                        <p:attrNameLst>
+                                          <p:attrName>style.color</p:attrName>
+                                        </p:attrNameLst>
+                                      </p:cBhvr>
+                                      <p:by>
+                                        <p:hsl h="7200000" s="0" l="0"/>
+                                      </p:by>
+                                    </p:animClr>
+                                    <p:animClr clrSpc="hsl" dir="cw">
+                                      <p:cBhvr>
+                                        <p:cTn id="72" dur="500" fill="hold"/>
+                                        <p:tgtEl>
+                                          <p:spTgt spid="22"/>
+                                        </p:tgtEl>
+                                        <p:attrNameLst>
+                                          <p:attrName>fillcolor</p:attrName>
+                                        </p:attrNameLst>
+                                      </p:cBhvr>
+                                      <p:by>
+                                        <p:hsl h="7200000" s="0" l="0"/>
+                                      </p:by>
+                                    </p:animClr>
+                                    <p:animClr clrSpc="hsl" dir="cw">
+                                      <p:cBhvr>
+                                        <p:cTn id="73" dur="500" fill="hold"/>
+                                        <p:tgtEl>
+                                          <p:spTgt spid="22"/>
+                                        </p:tgtEl>
+                                        <p:attrNameLst>
+                                          <p:attrName>stroke.color</p:attrName>
+                                        </p:attrNameLst>
+                                      </p:cBhvr>
+                                      <p:by>
+                                        <p:hsl h="7200000" s="0" l="0"/>
+                                      </p:by>
+                                    </p:animClr>
+                                    <p:set>
+                                      <p:cBhvr>
+                                        <p:cTn id="74" dur="500" fill="hold"/>
+                                        <p:tgtEl>
+                                          <p:spTgt spid="22"/>
+                                        </p:tgtEl>
+                                        <p:attrNameLst>
+                                          <p:attrName>fill.type</p:attrName>
+                                        </p:attrNameLst>
+                                      </p:cBhvr>
+                                      <p:to>
+                                        <p:strVal val="solid"/>
+                                      </p:to>
+                                    </p:set>
+                                  </p:childTnLst>
+                                </p:cTn>
+                              </p:par>
+                            </p:childTnLst>
+                          </p:cTn>
+                        </p:par>
+                      </p:childTnLst>
+                    </p:cTn>
+                  </p:par>
+                  <p:par>
+                    <p:cTn id="75" fill="hold">
+                      <p:stCondLst>
+                        <p:cond delay="indefinite"/>
+                      </p:stCondLst>
+                      <p:childTnLst>
+                        <p:par>
+                          <p:cTn id="76" fill="hold">
+                            <p:stCondLst>
+                              <p:cond delay="0"/>
+                            </p:stCondLst>
+                            <p:childTnLst>
+                              <p:par>
+                                <p:cTn id="77" presetID="2" presetClass="entr" presetSubtype="1" fill="hold" nodeType="clickEffect">
+                                  <p:stCondLst>
+                                    <p:cond delay="0"/>
+                                  </p:stCondLst>
+                                  <p:childTnLst>
+                                    <p:set>
+                                      <p:cBhvr>
+                                        <p:cTn id="78" dur="1" fill="hold">
+                                          <p:stCondLst>
+                                            <p:cond delay="0"/>
+                                          </p:stCondLst>
+                                        </p:cTn>
+                                        <p:tgtEl>
+                                          <p:spTgt spid="25"/>
+                                        </p:tgtEl>
+                                        <p:attrNameLst>
+                                          <p:attrName>style.visibility</p:attrName>
+                                        </p:attrNameLst>
+                                      </p:cBhvr>
+                                      <p:to>
+                                        <p:strVal val="visible"/>
+                                      </p:to>
+                                    </p:set>
+                                    <p:anim calcmode="lin" valueType="num">
+                                      <p:cBhvr additive="base">
+                                        <p:cTn id="79" dur="500" fill="hold"/>
+                                        <p:tgtEl>
+                                          <p:spTgt spid="25"/>
+                                        </p:tgtEl>
+                                        <p:attrNameLst>
+                                          <p:attrName>ppt_x</p:attrName>
+                                        </p:attrNameLst>
+                                      </p:cBhvr>
+                                      <p:tavLst>
+                                        <p:tav tm="0">
+                                          <p:val>
+                                            <p:strVal val="#ppt_x"/>
+                                          </p:val>
+                                        </p:tav>
+                                        <p:tav tm="100000">
+                                          <p:val>
+                                            <p:strVal val="#ppt_x"/>
+                                          </p:val>
+                                        </p:tav>
+                                      </p:tavLst>
+                                    </p:anim>
+                                    <p:anim calcmode="lin" valueType="num">
+                                      <p:cBhvr additive="base">
+                                        <p:cTn id="80" dur="500" fill="hold"/>
+                                        <p:tgtEl>
+                                          <p:spTgt spid="25"/>
+                                        </p:tgtEl>
+                                        <p:attrNameLst>
+                                          <p:attrName>ppt_y</p:attrName>
+                                        </p:attrNameLst>
+                                      </p:cBhvr>
+                                      <p:tavLst>
+                                        <p:tav tm="0">
+                                          <p:val>
+                                            <p:strVal val="0-#ppt_h/2"/>
+                                          </p:val>
+                                        </p:tav>
+                                        <p:tav tm="100000">
+                                          <p:val>
+                                            <p:strVal val="#ppt_y"/>
+                                          </p:val>
+                                        </p:tav>
+                                      </p:tavLst>
+                                    </p:anim>
+                                  </p:childTnLst>
+                                </p:cTn>
+                              </p:par>
+                              <p:par>
+                                <p:cTn id="81" presetID="2" presetClass="entr" presetSubtype="2" fill="hold" grpId="0" nodeType="withEffect">
+                                  <p:stCondLst>
+                                    <p:cond delay="0"/>
+                                  </p:stCondLst>
+                                  <p:iterate type="wd">
+                                    <p:tmPct val="15000"/>
+                                  </p:iterate>
+                                  <p:childTnLst>
+                                    <p:set>
+                                      <p:cBhvr>
+                                        <p:cTn id="82" dur="1" fill="hold">
+                                          <p:stCondLst>
+                                            <p:cond delay="0"/>
+                                          </p:stCondLst>
+                                        </p:cTn>
+                                        <p:tgtEl>
+                                          <p:spTgt spid="26"/>
+                                        </p:tgtEl>
+                                        <p:attrNameLst>
+                                          <p:attrName>style.visibility</p:attrName>
+                                        </p:attrNameLst>
+                                      </p:cBhvr>
+                                      <p:to>
+                                        <p:strVal val="visible"/>
+                                      </p:to>
+                                    </p:set>
+                                    <p:anim calcmode="lin" valueType="num">
+                                      <p:cBhvr additive="base">
+                                        <p:cTn id="83" dur="500" fill="hold"/>
+                                        <p:tgtEl>
+                                          <p:spTgt spid="26"/>
+                                        </p:tgtEl>
+                                        <p:attrNameLst>
+                                          <p:attrName>ppt_x</p:attrName>
+                                        </p:attrNameLst>
+                                      </p:cBhvr>
+                                      <p:tavLst>
+                                        <p:tav tm="0">
+                                          <p:val>
+                                            <p:strVal val="1+#ppt_w/2"/>
+                                          </p:val>
+                                        </p:tav>
+                                        <p:tav tm="100000">
+                                          <p:val>
+                                            <p:strVal val="#ppt_x"/>
+                                          </p:val>
+                                        </p:tav>
+                                      </p:tavLst>
+                                    </p:anim>
+                                    <p:anim calcmode="lin" valueType="num">
+                                      <p:cBhvr additive="base">
+                                        <p:cTn id="84" dur="500" fill="hold"/>
+                                        <p:tgtEl>
+                                          <p:spTgt spid="26"/>
+                                        </p:tgtEl>
+                                        <p:attrNameLst>
+                                          <p:attrName>ppt_y</p:attrName>
+                                        </p:attrNameLst>
+                                      </p:cBhvr>
+                                      <p:tavLst>
+                                        <p:tav tm="0">
+                                          <p:val>
+                                            <p:strVal val="#ppt_y"/>
+                                          </p:val>
+                                        </p:tav>
+                                        <p:tav tm="100000">
+                                          <p:val>
+                                            <p:strVal val="#ppt_y"/>
+                                          </p:val>
+                                        </p:tav>
+                                      </p:tavLst>
+                                    </p:anim>
+                                  </p:childTnLst>
+                                </p:cTn>
+                              </p:par>
+                            </p:childTnLst>
+                          </p:cTn>
+                        </p:par>
+                      </p:childTnLst>
+                    </p:cTn>
+                  </p:par>
+                  <p:par>
+                    <p:cTn id="85" fill="hold">
+                      <p:stCondLst>
+                        <p:cond delay="indefinite"/>
+                      </p:stCondLst>
+                      <p:childTnLst>
+                        <p:par>
+                          <p:cTn id="86" fill="hold">
+                            <p:stCondLst>
+                              <p:cond delay="0"/>
+                            </p:stCondLst>
+                            <p:childTnLst>
+                              <p:par>
+                                <p:cTn id="87" presetID="21" presetClass="emph" presetSubtype="0" fill="hold" grpId="1" nodeType="clickEffect">
+                                  <p:stCondLst>
+                                    <p:cond delay="0"/>
+                                  </p:stCondLst>
+                                  <p:iterate type="wd">
+                                    <p:tmPct val="0"/>
+                                  </p:iterate>
+                                  <p:childTnLst>
+                                    <p:animClr clrSpc="hsl" dir="cw">
+                                      <p:cBhvr override="childStyle">
+                                        <p:cTn id="88" dur="500" fill="hold"/>
+                                        <p:tgtEl>
+                                          <p:spTgt spid="26"/>
+                                        </p:tgtEl>
+                                        <p:attrNameLst>
+                                          <p:attrName>style.color</p:attrName>
+                                        </p:attrNameLst>
+                                      </p:cBhvr>
+                                      <p:by>
+                                        <p:hsl h="7200000" s="0" l="0"/>
+                                      </p:by>
+                                    </p:animClr>
+                                    <p:animClr clrSpc="hsl" dir="cw">
+                                      <p:cBhvr>
+                                        <p:cTn id="89" dur="500" fill="hold"/>
+                                        <p:tgtEl>
+                                          <p:spTgt spid="26"/>
+                                        </p:tgtEl>
+                                        <p:attrNameLst>
+                                          <p:attrName>fillcolor</p:attrName>
+                                        </p:attrNameLst>
+                                      </p:cBhvr>
+                                      <p:by>
+                                        <p:hsl h="7200000" s="0" l="0"/>
+                                      </p:by>
+                                    </p:animClr>
+                                    <p:animClr clrSpc="hsl" dir="cw">
+                                      <p:cBhvr>
+                                        <p:cTn id="90" dur="500" fill="hold"/>
+                                        <p:tgtEl>
+                                          <p:spTgt spid="26"/>
+                                        </p:tgtEl>
+                                        <p:attrNameLst>
+                                          <p:attrName>stroke.color</p:attrName>
+                                        </p:attrNameLst>
+                                      </p:cBhvr>
+                                      <p:by>
+                                        <p:hsl h="7200000" s="0" l="0"/>
+                                      </p:by>
+                                    </p:animClr>
+                                    <p:set>
+                                      <p:cBhvr>
+                                        <p:cTn id="91" dur="500" fill="hold"/>
+                                        <p:tgtEl>
+                                          <p:spTgt spid="26"/>
+                                        </p:tgtEl>
+                                        <p:attrNameLst>
+                                          <p:attrName>fill.type</p:attrName>
+                                        </p:attrNameLst>
+                                      </p:cBhvr>
+                                      <p:to>
+                                        <p:strVal val="solid"/>
+                                      </p:to>
+                                    </p:set>
+                                  </p:childTnLst>
+                                </p:cTn>
+                              </p:par>
+                            </p:childTnLst>
+                          </p:cTn>
+                        </p:par>
+                      </p:childTnLst>
+                    </p:cTn>
+                  </p:par>
+                </p:childTnLst>
+              </p:cTn>
+              <p:prevCondLst>
+                <p:cond evt="onPrev" delay="0">
+                  <p:tgtEl>
+                    <p:sldTgt/>
+                  </p:tgtEl>
+                </p:cond>
+              </p:prevCondLst>
+              <p:nextCondLst>
+                <p:cond evt="onNext" delay="0">
+                  <p:tgtEl>
+                    <p:sldTgt/>
+                  </p:tgtEl>
+                </p:cond>
+              </p:nextCondLst>
+            </p:seq>
+          </p:childTnLst>
+        </p:cTn>
+      </p:par>
+    </p:tnLst>
+    <p:bldLst>
+      <p:bldP spid="2" grpId="0" animBg="1"/>
+      <p:bldP spid="16" grpId="0" animBg="1"/>
+      <p:bldP spid="17" grpId="0" animBg="1"/>
+      <p:bldP spid="3" grpId="1" animBg="1"/>
+      <p:bldP spid="18" grpId="0" animBg="1"/>
+      <p:bldP spid="18" grpId="1" animBg="1"/>
+      <p:bldP spid="21" grpId="0" animBg="1"/>
+      <p:bldP spid="21" grpId="1" animBg="1"/>
+      <p:bldP spid="22" grpId="0" animBg="1"/>
+      <p:bldP spid="22" grpId="1" animBg="1"/>
+      <p:bldP spid="26" grpId="0" animBg="1"/>
+      <p:bldP spid="26" grpId="1" animBg="1"/>
+    </p:bldLst>
+  </p:timing>
+</p:sld>
+</file>
+
 <file path=ppt/theme/theme1.xml><?xml version="1.0" encoding="utf-8"?>
 <a:theme xmlns:a="http://schemas.openxmlformats.org/drawingml/2006/main" name="Office Theme">
   <a:themeElements>

</xml_diff>